<commit_message>
usuarios, tickets, rutinas, instancia a la base de datos, login, limpieza de código
usuarios, tickets, rutinas, instancia a la base de datos, login, limpieza de código
</commit_message>
<xml_diff>
--- a/docs/diagrama.pptx
+++ b/docs/diagrama.pptx
@@ -288,7 +288,7 @@
           <a:p>
             <a:fld id="{FF6C3006-36F6-4868-B0A8-0C59643245CA}" type="datetimeFigureOut">
               <a:rPr lang="es-AR" smtClean="0"/>
-              <a:t>11/10/2017</a:t>
+              <a:t>25/10/2017</a:t>
             </a:fld>
             <a:endParaRPr lang="es-AR"/>
           </a:p>
@@ -458,7 +458,7 @@
           <a:p>
             <a:fld id="{FF6C3006-36F6-4868-B0A8-0C59643245CA}" type="datetimeFigureOut">
               <a:rPr lang="es-AR" smtClean="0"/>
-              <a:t>11/10/2017</a:t>
+              <a:t>25/10/2017</a:t>
             </a:fld>
             <a:endParaRPr lang="es-AR"/>
           </a:p>
@@ -638,7 +638,7 @@
           <a:p>
             <a:fld id="{FF6C3006-36F6-4868-B0A8-0C59643245CA}" type="datetimeFigureOut">
               <a:rPr lang="es-AR" smtClean="0"/>
-              <a:t>11/10/2017</a:t>
+              <a:t>25/10/2017</a:t>
             </a:fld>
             <a:endParaRPr lang="es-AR"/>
           </a:p>
@@ -808,7 +808,7 @@
           <a:p>
             <a:fld id="{FF6C3006-36F6-4868-B0A8-0C59643245CA}" type="datetimeFigureOut">
               <a:rPr lang="es-AR" smtClean="0"/>
-              <a:t>11/10/2017</a:t>
+              <a:t>25/10/2017</a:t>
             </a:fld>
             <a:endParaRPr lang="es-AR"/>
           </a:p>
@@ -1054,7 +1054,7 @@
           <a:p>
             <a:fld id="{FF6C3006-36F6-4868-B0A8-0C59643245CA}" type="datetimeFigureOut">
               <a:rPr lang="es-AR" smtClean="0"/>
-              <a:t>11/10/2017</a:t>
+              <a:t>25/10/2017</a:t>
             </a:fld>
             <a:endParaRPr lang="es-AR"/>
           </a:p>
@@ -1342,7 +1342,7 @@
           <a:p>
             <a:fld id="{FF6C3006-36F6-4868-B0A8-0C59643245CA}" type="datetimeFigureOut">
               <a:rPr lang="es-AR" smtClean="0"/>
-              <a:t>11/10/2017</a:t>
+              <a:t>25/10/2017</a:t>
             </a:fld>
             <a:endParaRPr lang="es-AR"/>
           </a:p>
@@ -1764,7 +1764,7 @@
           <a:p>
             <a:fld id="{FF6C3006-36F6-4868-B0A8-0C59643245CA}" type="datetimeFigureOut">
               <a:rPr lang="es-AR" smtClean="0"/>
-              <a:t>11/10/2017</a:t>
+              <a:t>25/10/2017</a:t>
             </a:fld>
             <a:endParaRPr lang="es-AR"/>
           </a:p>
@@ -1882,7 +1882,7 @@
           <a:p>
             <a:fld id="{FF6C3006-36F6-4868-B0A8-0C59643245CA}" type="datetimeFigureOut">
               <a:rPr lang="es-AR" smtClean="0"/>
-              <a:t>11/10/2017</a:t>
+              <a:t>25/10/2017</a:t>
             </a:fld>
             <a:endParaRPr lang="es-AR"/>
           </a:p>
@@ -1977,7 +1977,7 @@
           <a:p>
             <a:fld id="{FF6C3006-36F6-4868-B0A8-0C59643245CA}" type="datetimeFigureOut">
               <a:rPr lang="es-AR" smtClean="0"/>
-              <a:t>11/10/2017</a:t>
+              <a:t>25/10/2017</a:t>
             </a:fld>
             <a:endParaRPr lang="es-AR"/>
           </a:p>
@@ -2254,7 +2254,7 @@
           <a:p>
             <a:fld id="{FF6C3006-36F6-4868-B0A8-0C59643245CA}" type="datetimeFigureOut">
               <a:rPr lang="es-AR" smtClean="0"/>
-              <a:t>11/10/2017</a:t>
+              <a:t>25/10/2017</a:t>
             </a:fld>
             <a:endParaRPr lang="es-AR"/>
           </a:p>
@@ -2507,7 +2507,7 @@
           <a:p>
             <a:fld id="{FF6C3006-36F6-4868-B0A8-0C59643245CA}" type="datetimeFigureOut">
               <a:rPr lang="es-AR" smtClean="0"/>
-              <a:t>11/10/2017</a:t>
+              <a:t>25/10/2017</a:t>
             </a:fld>
             <a:endParaRPr lang="es-AR"/>
           </a:p>
@@ -2720,7 +2720,7 @@
           <a:p>
             <a:fld id="{FF6C3006-36F6-4868-B0A8-0C59643245CA}" type="datetimeFigureOut">
               <a:rPr lang="es-AR" smtClean="0"/>
-              <a:t>11/10/2017</a:t>
+              <a:t>25/10/2017</a:t>
             </a:fld>
             <a:endParaRPr lang="es-AR"/>
           </a:p>
@@ -3103,7 +3103,7 @@
         </p:nvSpPr>
         <p:spPr>
           <a:xfrm>
-            <a:off x="899592" y="620688"/>
+            <a:off x="467544" y="392284"/>
             <a:ext cx="2736304" cy="461665"/>
           </a:xfrm>
           <a:prstGeom prst="rect">
@@ -3132,8 +3132,12 @@
           <a:p>
             <a:pPr algn="ctr"/>
             <a:r>
+              <a:rPr lang="es-AR" sz="2400" dirty="0"/>
+              <a:t>u</a:t>
+            </a:r>
+            <a:r>
               <a:rPr lang="es-AR" sz="2400" dirty="0" smtClean="0"/>
-              <a:t>usuarios</a:t>
+              <a:t>suarioapp__c</a:t>
             </a:r>
             <a:endParaRPr lang="es-AR" sz="2400" dirty="0"/>
           </a:p>
@@ -3147,7 +3151,7 @@
         </p:nvSpPr>
         <p:spPr>
           <a:xfrm>
-            <a:off x="899592" y="1268760"/>
+            <a:off x="4932040" y="484620"/>
             <a:ext cx="2693452" cy="461665"/>
           </a:xfrm>
           <a:prstGeom prst="rect">
@@ -3243,8 +3247,13 @@
           <a:p>
             <a:r>
               <a:rPr lang="es-AR" sz="2400" dirty="0"/>
-              <a:t>plantas</a:t>
-            </a:r>
+              <a:t>p</a:t>
+            </a:r>
+            <a:r>
+              <a:rPr lang="es-AR" sz="2400" dirty="0" smtClean="0"/>
+              <a:t>lanta__c</a:t>
+            </a:r>
+            <a:endParaRPr lang="es-AR" sz="2400" dirty="0"/>
           </a:p>
         </p:txBody>
       </p:sp>
@@ -3256,7 +3265,7 @@
         </p:nvSpPr>
         <p:spPr>
           <a:xfrm>
-            <a:off x="899592" y="2636912"/>
+            <a:off x="4889188" y="2420888"/>
             <a:ext cx="2736304" cy="461665"/>
           </a:xfrm>
           <a:prstGeom prst="rect">
@@ -3351,9 +3360,10 @@
           </a:lstStyle>
           <a:p>
             <a:r>
-              <a:rPr lang="es-AR" sz="2400" dirty="0"/>
-              <a:t>rutinas</a:t>
-            </a:r>
+              <a:rPr lang="es-AR" sz="2400" dirty="0" smtClean="0"/>
+              <a:t>rutinas__c</a:t>
+            </a:r>
+            <a:endParaRPr lang="es-AR" sz="2400" dirty="0"/>
           </a:p>
         </p:txBody>
       </p:sp>
@@ -3365,7 +3375,7 @@
         </p:nvSpPr>
         <p:spPr>
           <a:xfrm>
-            <a:off x="899592" y="1964439"/>
+            <a:off x="6012160" y="5301208"/>
             <a:ext cx="2736304" cy="461665"/>
           </a:xfrm>
           <a:prstGeom prst="rect">
@@ -3474,7 +3484,7 @@
         </p:nvSpPr>
         <p:spPr>
           <a:xfrm>
-            <a:off x="867098" y="3325245"/>
+            <a:off x="6012160" y="5949280"/>
             <a:ext cx="2768798" cy="461665"/>
           </a:xfrm>
           <a:prstGeom prst="rect">

</xml_diff>